<commit_message>
alteração no texto do simulador e no slide
</commit_message>
<xml_diff>
--- a/Apresentação/Apresentação.pptx
+++ b/Apresentação/Apresentação.pptx
@@ -14,8 +14,9 @@
     <p:sldId id="263" r:id="rId8"/>
     <p:sldId id="269" r:id="rId9"/>
     <p:sldId id="264" r:id="rId10"/>
-    <p:sldId id="265" r:id="rId11"/>
-    <p:sldId id="262" r:id="rId12"/>
+    <p:sldId id="270" r:id="rId11"/>
+    <p:sldId id="265" r:id="rId12"/>
+    <p:sldId id="262" r:id="rId13"/>
   </p:sldIdLst>
   <p:sldSz cx="12192000" cy="6858000"/>
   <p:notesSz cx="6858000" cy="9144000"/>
@@ -253,7 +254,7 @@
           <a:p>
             <a:fld id="{1FE95C1F-3B94-4213-9793-2A9E61FD5042}" type="datetimeFigureOut">
               <a:rPr lang="pt-BR" smtClean="0"/>
-              <a:t>10/03/2020</a:t>
+              <a:t>11/03/2020</a:t>
             </a:fld>
             <a:endParaRPr lang="pt-BR"/>
           </a:p>
@@ -423,7 +424,7 @@
           <a:p>
             <a:fld id="{1FE95C1F-3B94-4213-9793-2A9E61FD5042}" type="datetimeFigureOut">
               <a:rPr lang="pt-BR" smtClean="0"/>
-              <a:t>10/03/2020</a:t>
+              <a:t>11/03/2020</a:t>
             </a:fld>
             <a:endParaRPr lang="pt-BR"/>
           </a:p>
@@ -603,7 +604,7 @@
           <a:p>
             <a:fld id="{1FE95C1F-3B94-4213-9793-2A9E61FD5042}" type="datetimeFigureOut">
               <a:rPr lang="pt-BR" smtClean="0"/>
-              <a:t>10/03/2020</a:t>
+              <a:t>11/03/2020</a:t>
             </a:fld>
             <a:endParaRPr lang="pt-BR"/>
           </a:p>
@@ -773,7 +774,7 @@
           <a:p>
             <a:fld id="{1FE95C1F-3B94-4213-9793-2A9E61FD5042}" type="datetimeFigureOut">
               <a:rPr lang="pt-BR" smtClean="0"/>
-              <a:t>10/03/2020</a:t>
+              <a:t>11/03/2020</a:t>
             </a:fld>
             <a:endParaRPr lang="pt-BR"/>
           </a:p>
@@ -1019,7 +1020,7 @@
           <a:p>
             <a:fld id="{1FE95C1F-3B94-4213-9793-2A9E61FD5042}" type="datetimeFigureOut">
               <a:rPr lang="pt-BR" smtClean="0"/>
-              <a:t>10/03/2020</a:t>
+              <a:t>11/03/2020</a:t>
             </a:fld>
             <a:endParaRPr lang="pt-BR"/>
           </a:p>
@@ -1251,7 +1252,7 @@
           <a:p>
             <a:fld id="{1FE95C1F-3B94-4213-9793-2A9E61FD5042}" type="datetimeFigureOut">
               <a:rPr lang="pt-BR" smtClean="0"/>
-              <a:t>10/03/2020</a:t>
+              <a:t>11/03/2020</a:t>
             </a:fld>
             <a:endParaRPr lang="pt-BR"/>
           </a:p>
@@ -1618,7 +1619,7 @@
           <a:p>
             <a:fld id="{1FE95C1F-3B94-4213-9793-2A9E61FD5042}" type="datetimeFigureOut">
               <a:rPr lang="pt-BR" smtClean="0"/>
-              <a:t>10/03/2020</a:t>
+              <a:t>11/03/2020</a:t>
             </a:fld>
             <a:endParaRPr lang="pt-BR"/>
           </a:p>
@@ -1736,7 +1737,7 @@
           <a:p>
             <a:fld id="{1FE95C1F-3B94-4213-9793-2A9E61FD5042}" type="datetimeFigureOut">
               <a:rPr lang="pt-BR" smtClean="0"/>
-              <a:t>10/03/2020</a:t>
+              <a:t>11/03/2020</a:t>
             </a:fld>
             <a:endParaRPr lang="pt-BR"/>
           </a:p>
@@ -1831,7 +1832,7 @@
           <a:p>
             <a:fld id="{1FE95C1F-3B94-4213-9793-2A9E61FD5042}" type="datetimeFigureOut">
               <a:rPr lang="pt-BR" smtClean="0"/>
-              <a:t>10/03/2020</a:t>
+              <a:t>11/03/2020</a:t>
             </a:fld>
             <a:endParaRPr lang="pt-BR"/>
           </a:p>
@@ -2108,7 +2109,7 @@
           <a:p>
             <a:fld id="{1FE95C1F-3B94-4213-9793-2A9E61FD5042}" type="datetimeFigureOut">
               <a:rPr lang="pt-BR" smtClean="0"/>
-              <a:t>10/03/2020</a:t>
+              <a:t>11/03/2020</a:t>
             </a:fld>
             <a:endParaRPr lang="pt-BR"/>
           </a:p>
@@ -2365,7 +2366,7 @@
           <a:p>
             <a:fld id="{1FE95C1F-3B94-4213-9793-2A9E61FD5042}" type="datetimeFigureOut">
               <a:rPr lang="pt-BR" smtClean="0"/>
-              <a:t>10/03/2020</a:t>
+              <a:t>11/03/2020</a:t>
             </a:fld>
             <a:endParaRPr lang="pt-BR"/>
           </a:p>
@@ -2578,7 +2579,7 @@
           <a:p>
             <a:fld id="{1FE95C1F-3B94-4213-9793-2A9E61FD5042}" type="datetimeFigureOut">
               <a:rPr lang="pt-BR" smtClean="0"/>
-              <a:t>10/03/2020</a:t>
+              <a:t>11/03/2020</a:t>
             </a:fld>
             <a:endParaRPr lang="pt-BR"/>
           </a:p>
@@ -3046,6 +3047,85 @@
   <p:cSld>
     <p:bg>
       <p:bgPr>
+        <a:blipFill dpi="0" rotWithShape="1">
+          <a:blip r:embed="rId2">
+            <a:lum/>
+          </a:blip>
+          <a:srcRect/>
+          <a:stretch>
+            <a:fillRect t="-1000" b="-10000"/>
+          </a:stretch>
+        </a:blipFill>
+        <a:effectLst/>
+      </p:bgPr>
+    </p:bg>
+    <p:spTree>
+      <p:nvGrpSpPr>
+        <p:cNvPr id="1" name=""/>
+        <p:cNvGrpSpPr/>
+        <p:nvPr/>
+      </p:nvGrpSpPr>
+      <p:grpSpPr>
+        <a:xfrm>
+          <a:off x="0" y="0"/>
+          <a:ext cx="0" cy="0"/>
+          <a:chOff x="0" y="0"/>
+          <a:chExt cx="0" cy="0"/>
+        </a:xfrm>
+      </p:grpSpPr>
+      <p:sp>
+        <p:nvSpPr>
+          <p:cNvPr id="4" name="CaixaDeTexto 3"/>
+          <p:cNvSpPr txBox="1"/>
+          <p:nvPr/>
+        </p:nvSpPr>
+        <p:spPr>
+          <a:xfrm>
+            <a:off x="927463" y="849086"/>
+            <a:ext cx="3617144" cy="923330"/>
+          </a:xfrm>
+          <a:prstGeom prst="rect">
+            <a:avLst/>
+          </a:prstGeom>
+          <a:noFill/>
+        </p:spPr>
+        <p:txBody>
+          <a:bodyPr wrap="none" rtlCol="0">
+            <a:spAutoFit/>
+          </a:bodyPr>
+          <a:lstStyle/>
+          <a:p>
+            <a:r>
+              <a:rPr lang="pt-BR" dirty="0" smtClean="0"/>
+              <a:t>QUANTO CUSTARÁ NOSSO SERVIÇO?</a:t>
+            </a:r>
+          </a:p>
+          <a:p>
+            <a:endParaRPr lang="pt-BR" dirty="0"/>
+          </a:p>
+          <a:p>
+            <a:endParaRPr lang="pt-BR" dirty="0"/>
+          </a:p>
+        </p:txBody>
+      </p:sp>
+    </p:spTree>
+    <p:extLst>
+      <p:ext uri="{BB962C8B-B14F-4D97-AF65-F5344CB8AC3E}">
+        <p14:creationId xmlns:p14="http://schemas.microsoft.com/office/powerpoint/2010/main" val="3431491277"/>
+      </p:ext>
+    </p:extLst>
+  </p:cSld>
+  <p:clrMapOvr>
+    <a:masterClrMapping/>
+  </p:clrMapOvr>
+</p:sld>
+</file>
+
+<file path=ppt/slides/slide11.xml><?xml version="1.0" encoding="utf-8"?>
+<p:sld xmlns:a="http://schemas.openxmlformats.org/drawingml/2006/main" xmlns:r="http://schemas.openxmlformats.org/officeDocument/2006/relationships" xmlns:p="http://schemas.openxmlformats.org/presentationml/2006/main">
+  <p:cSld>
+    <p:bg>
+      <p:bgPr>
         <a:solidFill>
           <a:schemeClr val="tx1"/>
         </a:solidFill>
@@ -3200,7 +3280,7 @@
 </p:sld>
 </file>
 
-<file path=ppt/slides/slide11.xml><?xml version="1.0" encoding="utf-8"?>
+<file path=ppt/slides/slide12.xml><?xml version="1.0" encoding="utf-8"?>
 <p:sld xmlns:a="http://schemas.openxmlformats.org/drawingml/2006/main" xmlns:r="http://schemas.openxmlformats.org/officeDocument/2006/relationships" xmlns:p="http://schemas.openxmlformats.org/presentationml/2006/main">
   <p:cSld>
     <p:bg>
@@ -8618,6 +8698,7 @@
                 <a:solidFill>
                   <a:schemeClr val="bg1"/>
                 </a:solidFill>
+                <a:hlinkClick r:id="rId2" action="ppaction://hlinkfile"/>
               </a:rPr>
               <a:t>SIMULADOR FINANCEIRO</a:t>
             </a:r>
@@ -8673,7 +8754,23 @@
                   <a:schemeClr val="bg1"/>
                 </a:solidFill>
               </a:rPr>
-              <a:t>DE ACORDO COM NOSSAS PESQUISAS, PODE-SE ECONOMIZAR, EM MÉDIA, DE 23 A 25% DO CONSUMO DE ENERGIA ELÉTRICA VOLTADO PARA A ILUMINAÇÃO</a:t>
+              <a:t>DE ACORDO COM NOSSAS PESQUISAS, PODE-SE ECONOMIZAR, EM MÉDIA, </a:t>
+            </a:r>
+            <a:r>
+              <a:rPr lang="pt-BR" sz="2000" b="1" dirty="0" smtClean="0">
+                <a:solidFill>
+                  <a:schemeClr val="bg1"/>
+                </a:solidFill>
+              </a:rPr>
+              <a:t>ATÉ 25</a:t>
+            </a:r>
+            <a:r>
+              <a:rPr lang="pt-BR" sz="2000" b="1" dirty="0" smtClean="0">
+                <a:solidFill>
+                  <a:schemeClr val="bg1"/>
+                </a:solidFill>
+              </a:rPr>
+              <a:t>% DO CONSUMO DE ENERGIA ELÉTRICA VOLTADO PARA A ILUMINAÇÃO</a:t>
             </a:r>
             <a:r>
               <a:rPr lang="pt-BR" b="1" dirty="0" smtClean="0">
@@ -8706,7 +8803,7 @@
           <p:nvPr/>
         </p:nvPicPr>
         <p:blipFill>
-          <a:blip r:embed="rId2">
+          <a:blip r:embed="rId3">
             <a:extLst>
               <a:ext uri="{28A0092B-C50C-407E-A947-70E740481C1C}">
                 <a14:useLocalDpi xmlns:a14="http://schemas.microsoft.com/office/drawing/2010/main" val="0"/>

</xml_diff>